<commit_message>
Revised architecture diagram (.pptx and .png)
</commit_message>
<xml_diff>
--- a/docs/images/architecture_vault.pptx
+++ b/docs/images/architecture_vault.pptx
@@ -104,6 +104,11 @@
       </a:defRPr>
     </a:lvl9pPr>
   </p:defaultTextStyle>
+  <p:extLst>
+    <p:ext uri="{EFAFB233-063F-42B5-8137-9DF3F51BA10A}">
+      <p15:sldGuideLst xmlns:p15="http://schemas.microsoft.com/office/powerpoint/2012/main"/>
+    </p:ext>
+  </p:extLst>
 </p:presentation>
 </file>
 
@@ -254,7 +259,7 @@
           <a:p>
             <a:fld id="{59509CB6-7E02-204D-BF0A-104E8471A1BF}" type="datetimeFigureOut">
               <a:rPr lang="en-US" smtClean="0"/>
-              <a:t>8/31/20</a:t>
+              <a:t>10/26/2020</a:t>
             </a:fld>
             <a:endParaRPr lang="en-US"/>
           </a:p>
@@ -452,7 +457,7 @@
           <a:p>
             <a:fld id="{59509CB6-7E02-204D-BF0A-104E8471A1BF}" type="datetimeFigureOut">
               <a:rPr lang="en-US" smtClean="0"/>
-              <a:t>8/31/20</a:t>
+              <a:t>10/26/2020</a:t>
             </a:fld>
             <a:endParaRPr lang="en-US"/>
           </a:p>
@@ -660,7 +665,7 @@
           <a:p>
             <a:fld id="{59509CB6-7E02-204D-BF0A-104E8471A1BF}" type="datetimeFigureOut">
               <a:rPr lang="en-US" smtClean="0"/>
-              <a:t>8/31/20</a:t>
+              <a:t>10/26/2020</a:t>
             </a:fld>
             <a:endParaRPr lang="en-US"/>
           </a:p>
@@ -858,7 +863,7 @@
           <a:p>
             <a:fld id="{59509CB6-7E02-204D-BF0A-104E8471A1BF}" type="datetimeFigureOut">
               <a:rPr lang="en-US" smtClean="0"/>
-              <a:t>8/31/20</a:t>
+              <a:t>10/26/2020</a:t>
             </a:fld>
             <a:endParaRPr lang="en-US"/>
           </a:p>
@@ -1133,7 +1138,7 @@
           <a:p>
             <a:fld id="{59509CB6-7E02-204D-BF0A-104E8471A1BF}" type="datetimeFigureOut">
               <a:rPr lang="en-US" smtClean="0"/>
-              <a:t>8/31/20</a:t>
+              <a:t>10/26/2020</a:t>
             </a:fld>
             <a:endParaRPr lang="en-US"/>
           </a:p>
@@ -1398,7 +1403,7 @@
           <a:p>
             <a:fld id="{59509CB6-7E02-204D-BF0A-104E8471A1BF}" type="datetimeFigureOut">
               <a:rPr lang="en-US" smtClean="0"/>
-              <a:t>8/31/20</a:t>
+              <a:t>10/26/2020</a:t>
             </a:fld>
             <a:endParaRPr lang="en-US"/>
           </a:p>
@@ -1810,7 +1815,7 @@
           <a:p>
             <a:fld id="{59509CB6-7E02-204D-BF0A-104E8471A1BF}" type="datetimeFigureOut">
               <a:rPr lang="en-US" smtClean="0"/>
-              <a:t>8/31/20</a:t>
+              <a:t>10/26/2020</a:t>
             </a:fld>
             <a:endParaRPr lang="en-US"/>
           </a:p>
@@ -1951,7 +1956,7 @@
           <a:p>
             <a:fld id="{59509CB6-7E02-204D-BF0A-104E8471A1BF}" type="datetimeFigureOut">
               <a:rPr lang="en-US" smtClean="0"/>
-              <a:t>8/31/20</a:t>
+              <a:t>10/26/2020</a:t>
             </a:fld>
             <a:endParaRPr lang="en-US"/>
           </a:p>
@@ -2064,7 +2069,7 @@
           <a:p>
             <a:fld id="{59509CB6-7E02-204D-BF0A-104E8471A1BF}" type="datetimeFigureOut">
               <a:rPr lang="en-US" smtClean="0"/>
-              <a:t>8/31/20</a:t>
+              <a:t>10/26/2020</a:t>
             </a:fld>
             <a:endParaRPr lang="en-US"/>
           </a:p>
@@ -2375,7 +2380,7 @@
           <a:p>
             <a:fld id="{59509CB6-7E02-204D-BF0A-104E8471A1BF}" type="datetimeFigureOut">
               <a:rPr lang="en-US" smtClean="0"/>
-              <a:t>8/31/20</a:t>
+              <a:t>10/26/2020</a:t>
             </a:fld>
             <a:endParaRPr lang="en-US"/>
           </a:p>
@@ -2663,7 +2668,7 @@
           <a:p>
             <a:fld id="{59509CB6-7E02-204D-BF0A-104E8471A1BF}" type="datetimeFigureOut">
               <a:rPr lang="en-US" smtClean="0"/>
-              <a:t>8/31/20</a:t>
+              <a:t>10/26/2020</a:t>
             </a:fld>
             <a:endParaRPr lang="en-US"/>
           </a:p>
@@ -2904,7 +2909,7 @@
           <a:p>
             <a:fld id="{59509CB6-7E02-204D-BF0A-104E8471A1BF}" type="datetimeFigureOut">
               <a:rPr lang="en-US" smtClean="0"/>
-              <a:t>8/31/20</a:t>
+              <a:t>10/26/2020</a:t>
             </a:fld>
             <a:endParaRPr lang="en-US"/>
           </a:p>
@@ -3369,7 +3374,9 @@
               </a:spcAft>
               <a:buNone/>
             </a:pPr>
-            <a:endParaRPr/>
+            <a:endParaRPr>
+              <a:latin typeface="Consolas" panose="020B0609020204030204" pitchFamily="49" charset="0"/>
+            </a:endParaRPr>
           </a:p>
         </p:txBody>
       </p:sp>
@@ -3391,7 +3398,7 @@
           <a:blip r:embed="rId2">
             <a:extLst>
               <a:ext uri="{96DAC541-7B7A-43D3-8B79-37D633B846F1}">
-                <asvg:svgBlip xmlns:asvg="http://schemas.microsoft.com/office/drawing/2016/SVG/main" r:embed="rId3"/>
+                <asvg:svgBlip xmlns="" xmlns:asvg="http://schemas.microsoft.com/office/drawing/2016/SVG/main" r:embed="rId3"/>
               </a:ext>
             </a:extLst>
           </a:blip>
@@ -3401,7 +3408,7 @@
         </p:blipFill>
         <p:spPr>
           <a:xfrm>
-            <a:off x="9654631" y="2195413"/>
+            <a:off x="9692640" y="2195413"/>
             <a:ext cx="549549" cy="549549"/>
           </a:xfrm>
           <a:prstGeom prst="rect">
@@ -3457,7 +3464,9 @@
               </a:spcAft>
               <a:buNone/>
             </a:pPr>
-            <a:endParaRPr/>
+            <a:endParaRPr>
+              <a:latin typeface="Consolas" panose="020B0609020204030204" pitchFamily="49" charset="0"/>
+            </a:endParaRPr>
           </a:p>
         </p:txBody>
       </p:sp>
@@ -3537,7 +3546,7 @@
             </a:pPr>
             <a:r>
               <a:rPr lang="en-US" sz="900" dirty="0">
-                <a:latin typeface="Consolas"/>
+                <a:latin typeface="Consolas" panose="020B0609020204030204" pitchFamily="49" charset="0"/>
                 <a:ea typeface="Consolas"/>
                 <a:cs typeface="Consolas"/>
                 <a:sym typeface="Consolas"/>
@@ -3546,7 +3555,7 @@
             </a:r>
             <a:r>
               <a:rPr lang="fr" sz="900" dirty="0">
-                <a:latin typeface="Consolas"/>
+                <a:latin typeface="Consolas" panose="020B0609020204030204" pitchFamily="49" charset="0"/>
                 <a:ea typeface="Consolas"/>
                 <a:cs typeface="Consolas"/>
                 <a:sym typeface="Consolas"/>
@@ -3554,7 +3563,7 @@
               <a:t>ault-server</a:t>
             </a:r>
             <a:endParaRPr sz="900" dirty="0">
-              <a:latin typeface="Consolas"/>
+              <a:latin typeface="Consolas" panose="020B0609020204030204" pitchFamily="49" charset="0"/>
               <a:ea typeface="Consolas"/>
               <a:cs typeface="Consolas"/>
               <a:sym typeface="Consolas"/>
@@ -3610,7 +3619,9 @@
               </a:spcAft>
               <a:buNone/>
             </a:pPr>
-            <a:endParaRPr/>
+            <a:endParaRPr>
+              <a:latin typeface="Consolas" panose="020B0609020204030204" pitchFamily="49" charset="0"/>
+            </a:endParaRPr>
           </a:p>
         </p:txBody>
       </p:sp>
@@ -3690,7 +3701,7 @@
             </a:pPr>
             <a:r>
               <a:rPr lang="en-US" sz="900" dirty="0">
-                <a:latin typeface="Consolas"/>
+                <a:latin typeface="Consolas" panose="020B0609020204030204" pitchFamily="49" charset="0"/>
                 <a:ea typeface="Consolas"/>
                 <a:cs typeface="Consolas"/>
                 <a:sym typeface="Consolas"/>
@@ -3698,7 +3709,7 @@
               <a:t>bootstrap jobs</a:t>
             </a:r>
             <a:endParaRPr sz="900" dirty="0">
-              <a:latin typeface="Consolas"/>
+              <a:latin typeface="Consolas" panose="020B0609020204030204" pitchFamily="49" charset="0"/>
               <a:ea typeface="Consolas"/>
               <a:cs typeface="Consolas"/>
               <a:sym typeface="Consolas"/>
@@ -3762,7 +3773,7 @@
         </p:blipFill>
         <p:spPr>
           <a:xfrm>
-            <a:off x="1485832" y="5146431"/>
+            <a:off x="1485832" y="5120640"/>
             <a:ext cx="597600" cy="597600"/>
           </a:xfrm>
           <a:prstGeom prst="rect">
@@ -3856,7 +3867,9 @@
               </a:spcAft>
               <a:buNone/>
             </a:pPr>
-            <a:endParaRPr/>
+            <a:endParaRPr>
+              <a:latin typeface="Consolas" panose="020B0609020204030204" pitchFamily="49" charset="0"/>
+            </a:endParaRPr>
           </a:p>
         </p:txBody>
       </p:sp>
@@ -3902,7 +3915,7 @@
             </a:pPr>
             <a:r>
               <a:rPr lang="en-US" sz="900" dirty="0">
-                <a:latin typeface="Consolas"/>
+                <a:latin typeface="Consolas" panose="020B0609020204030204" pitchFamily="49" charset="0"/>
                 <a:ea typeface="Consolas"/>
                 <a:cs typeface="Consolas"/>
                 <a:sym typeface="Consolas"/>
@@ -3910,7 +3923,7 @@
               <a:t>dedicated node group</a:t>
             </a:r>
             <a:endParaRPr sz="900" dirty="0">
-              <a:latin typeface="Consolas"/>
+              <a:latin typeface="Consolas" panose="020B0609020204030204" pitchFamily="49" charset="0"/>
               <a:ea typeface="Consolas"/>
               <a:cs typeface="Consolas"/>
               <a:sym typeface="Consolas"/>
@@ -4042,7 +4055,7 @@
         </p:blipFill>
         <p:spPr>
           <a:xfrm>
-            <a:off x="6824332" y="5152618"/>
+            <a:off x="6824332" y="5120640"/>
             <a:ext cx="597831" cy="597825"/>
           </a:xfrm>
           <a:prstGeom prst="rect">
@@ -4068,7 +4081,7 @@
         </p:nvGrpSpPr>
         <p:grpSpPr>
           <a:xfrm>
-            <a:off x="7209937" y="5125521"/>
+            <a:off x="7209937" y="5120640"/>
             <a:ext cx="290100" cy="290100"/>
             <a:chOff x="1645130" y="2938914"/>
             <a:chExt cx="469900" cy="469900"/>
@@ -4122,7 +4135,9 @@
             <a:lstStyle/>
             <a:p>
               <a:pPr algn="ctr"/>
-              <a:endParaRPr lang="en-US"/>
+              <a:endParaRPr lang="en-US">
+                <a:latin typeface="Consolas" panose="020B0609020204030204" pitchFamily="49" charset="0"/>
+              </a:endParaRPr>
             </a:p>
           </p:txBody>
         </p:sp>
@@ -4144,7 +4159,7 @@
             <a:blip r:embed="rId10">
               <a:extLst>
                 <a:ext uri="{96DAC541-7B7A-43D3-8B79-37D633B846F1}">
-                  <asvg:svgBlip xmlns:asvg="http://schemas.microsoft.com/office/drawing/2016/SVG/main" r:embed="rId11"/>
+                  <asvg:svgBlip xmlns="" xmlns:asvg="http://schemas.microsoft.com/office/drawing/2016/SVG/main" r:embed="rId11"/>
                 </a:ext>
               </a:extLst>
             </a:blip>
@@ -4205,7 +4220,7 @@
             </a:pPr>
             <a:r>
               <a:rPr lang="en-US" sz="900" dirty="0">
-                <a:latin typeface="Consolas"/>
+                <a:latin typeface="Consolas" panose="020B0609020204030204" pitchFamily="49" charset="0"/>
                 <a:ea typeface="Consolas"/>
                 <a:cs typeface="Consolas"/>
                 <a:sym typeface="Consolas"/>
@@ -4233,7 +4248,7 @@
           <a:blip r:embed="rId12">
             <a:extLst>
               <a:ext uri="{96DAC541-7B7A-43D3-8B79-37D633B846F1}">
-                <asvg:svgBlip xmlns:asvg="http://schemas.microsoft.com/office/drawing/2016/SVG/main" r:embed="rId13"/>
+                <asvg:svgBlip xmlns="" xmlns:asvg="http://schemas.microsoft.com/office/drawing/2016/SVG/main" r:embed="rId13"/>
               </a:ext>
             </a:extLst>
           </a:blip>
@@ -4243,7 +4258,7 @@
         </p:blipFill>
         <p:spPr>
           <a:xfrm>
-            <a:off x="6908925" y="960906"/>
+            <a:off x="6949440" y="1005840"/>
             <a:ext cx="533400" cy="533400"/>
           </a:xfrm>
           <a:prstGeom prst="rect">
@@ -4269,7 +4284,7 @@
           <a:blip r:embed="rId14">
             <a:extLst>
               <a:ext uri="{96DAC541-7B7A-43D3-8B79-37D633B846F1}">
-                <asvg:svgBlip xmlns:asvg="http://schemas.microsoft.com/office/drawing/2016/SVG/main" r:embed="rId15"/>
+                <asvg:svgBlip xmlns="" xmlns:asvg="http://schemas.microsoft.com/office/drawing/2016/SVG/main" r:embed="rId15"/>
               </a:ext>
             </a:extLst>
           </a:blip>
@@ -4279,7 +4294,7 @@
         </p:blipFill>
         <p:spPr>
           <a:xfrm>
-            <a:off x="3441906" y="960906"/>
+            <a:off x="3451432" y="1005840"/>
             <a:ext cx="533400" cy="533400"/>
           </a:xfrm>
           <a:prstGeom prst="rect">
@@ -4301,7 +4316,7 @@
         </p:nvSpPr>
         <p:spPr>
           <a:xfrm>
-            <a:off x="6502355" y="1494306"/>
+            <a:off x="6502355" y="1554480"/>
             <a:ext cx="1419128" cy="290100"/>
           </a:xfrm>
           <a:prstGeom prst="rect">
@@ -4328,16 +4343,16 @@
               <a:buNone/>
             </a:pPr>
             <a:r>
-              <a:rPr lang="en-US" sz="900" dirty="0">
-                <a:latin typeface="Consolas"/>
+              <a:rPr lang="en-US" sz="900" smtClean="0">
+                <a:latin typeface="Consolas" panose="020B0609020204030204" pitchFamily="49" charset="0"/>
                 <a:ea typeface="Consolas"/>
                 <a:cs typeface="Consolas"/>
                 <a:sym typeface="Consolas"/>
               </a:rPr>
-              <a:t>KMS auto-unseal key</a:t>
+              <a:t>AWS KMS</a:t>
             </a:r>
             <a:endParaRPr sz="900" dirty="0">
-              <a:latin typeface="Consolas"/>
+              <a:latin typeface="Consolas" panose="020B0609020204030204" pitchFamily="49" charset="0"/>
               <a:ea typeface="Consolas"/>
               <a:cs typeface="Consolas"/>
               <a:sym typeface="Consolas"/>
@@ -4359,7 +4374,7 @@
         </p:nvSpPr>
         <p:spPr>
           <a:xfrm>
-            <a:off x="3059055" y="1500294"/>
+            <a:off x="3068581" y="1554480"/>
             <a:ext cx="1299102" cy="290100"/>
           </a:xfrm>
           <a:prstGeom prst="rect">
@@ -4386,16 +4401,16 @@
               <a:buNone/>
             </a:pPr>
             <a:r>
-              <a:rPr lang="en-US" sz="900" dirty="0">
-                <a:latin typeface="Consolas"/>
+              <a:rPr lang="en-US" sz="900" smtClean="0">
+                <a:latin typeface="Consolas" panose="020B0609020204030204" pitchFamily="49" charset="0"/>
                 <a:ea typeface="Consolas"/>
                 <a:cs typeface="Consolas"/>
                 <a:sym typeface="Consolas"/>
               </a:rPr>
-              <a:t>Vault root token</a:t>
+              <a:t>AWS Secrets Manager</a:t>
             </a:r>
             <a:endParaRPr sz="900" dirty="0">
-              <a:latin typeface="Consolas"/>
+              <a:latin typeface="Consolas" panose="020B0609020204030204" pitchFamily="49" charset="0"/>
               <a:ea typeface="Consolas"/>
               <a:cs typeface="Consolas"/>
               <a:sym typeface="Consolas"/>
@@ -4445,7 +4460,7 @@
             </a:pPr>
             <a:r>
               <a:rPr lang="en-US" sz="900" dirty="0">
-                <a:latin typeface="Consolas"/>
+                <a:latin typeface="Consolas" panose="020B0609020204030204" pitchFamily="49" charset="0"/>
                 <a:ea typeface="Consolas"/>
                 <a:cs typeface="Consolas"/>
                 <a:sym typeface="Consolas"/>
@@ -4453,7 +4468,7 @@
               <a:t>boot-vault job</a:t>
             </a:r>
             <a:endParaRPr sz="900" dirty="0">
-              <a:latin typeface="Consolas"/>
+              <a:latin typeface="Consolas" panose="020B0609020204030204" pitchFamily="49" charset="0"/>
               <a:ea typeface="Consolas"/>
               <a:cs typeface="Consolas"/>
               <a:sym typeface="Consolas"/>
@@ -4479,7 +4494,7 @@
           <a:blip r:embed="rId16">
             <a:extLst>
               <a:ext uri="{96DAC541-7B7A-43D3-8B79-37D633B846F1}">
-                <asvg:svgBlip xmlns:asvg="http://schemas.microsoft.com/office/drawing/2016/SVG/main" r:embed="rId17"/>
+                <asvg:svgBlip xmlns="" xmlns:asvg="http://schemas.microsoft.com/office/drawing/2016/SVG/main" r:embed="rId17"/>
               </a:ext>
             </a:extLst>
           </a:blip>
@@ -4489,7 +4504,7 @@
         </p:blipFill>
         <p:spPr>
           <a:xfrm>
-            <a:off x="4673342" y="1105082"/>
+            <a:off x="4673342" y="1097280"/>
             <a:ext cx="352425" cy="352425"/>
           </a:xfrm>
           <a:prstGeom prst="rect">
@@ -4539,7 +4554,7 @@
             </a:pPr>
             <a:r>
               <a:rPr lang="en-US" sz="900" dirty="0">
-                <a:latin typeface="Consolas"/>
+                <a:latin typeface="Consolas" panose="020B0609020204030204" pitchFamily="49" charset="0"/>
                 <a:ea typeface="Consolas"/>
                 <a:cs typeface="Consolas"/>
                 <a:sym typeface="Consolas"/>
@@ -4563,7 +4578,7 @@
         </p:nvSpPr>
         <p:spPr>
           <a:xfrm>
-            <a:off x="4200003" y="1494306"/>
+            <a:off x="4200003" y="1554480"/>
             <a:ext cx="1299102" cy="290100"/>
           </a:xfrm>
           <a:prstGeom prst="rect">
@@ -4591,7 +4606,7 @@
             </a:pPr>
             <a:r>
               <a:rPr lang="en-US" sz="900" dirty="0">
-                <a:latin typeface="Consolas"/>
+                <a:latin typeface="Consolas" panose="020B0609020204030204" pitchFamily="49" charset="0"/>
                 <a:ea typeface="Consolas"/>
                 <a:cs typeface="Consolas"/>
                 <a:sym typeface="Consolas"/>
@@ -4619,7 +4634,7 @@
           <a:blip r:embed="rId16">
             <a:extLst>
               <a:ext uri="{96DAC541-7B7A-43D3-8B79-37D633B846F1}">
-                <asvg:svgBlip xmlns:asvg="http://schemas.microsoft.com/office/drawing/2016/SVG/main" r:embed="rId17"/>
+                <asvg:svgBlip xmlns="" xmlns:asvg="http://schemas.microsoft.com/office/drawing/2016/SVG/main" r:embed="rId17"/>
               </a:ext>
             </a:extLst>
           </a:blip>
@@ -4629,7 +4644,7 @@
         </p:blipFill>
         <p:spPr>
           <a:xfrm>
-            <a:off x="5814289" y="1107434"/>
+            <a:off x="5760720" y="1097280"/>
             <a:ext cx="352425" cy="352425"/>
           </a:xfrm>
           <a:prstGeom prst="rect">
@@ -4651,7 +4666,7 @@
         </p:nvSpPr>
         <p:spPr>
           <a:xfrm>
-            <a:off x="5340950" y="1496658"/>
+            <a:off x="5340950" y="1554480"/>
             <a:ext cx="1299102" cy="290100"/>
           </a:xfrm>
           <a:prstGeom prst="rect">
@@ -4679,7 +4694,7 @@
             </a:pPr>
             <a:r>
               <a:rPr lang="en-US" sz="900" dirty="0">
-                <a:latin typeface="Consolas"/>
+                <a:latin typeface="Consolas" panose="020B0609020204030204" pitchFamily="49" charset="0"/>
                 <a:ea typeface="Consolas"/>
                 <a:cs typeface="Consolas"/>
                 <a:sym typeface="Consolas"/>
@@ -4731,7 +4746,7 @@
             </a:pPr>
             <a:r>
               <a:rPr lang="en-US" sz="900" dirty="0">
-                <a:latin typeface="Consolas"/>
+                <a:latin typeface="Consolas" panose="020B0609020204030204" pitchFamily="49" charset="0"/>
                 <a:ea typeface="Consolas"/>
                 <a:cs typeface="Consolas"/>
                 <a:sym typeface="Consolas"/>
@@ -4741,44 +4756,6 @@
           </a:p>
         </p:txBody>
       </p:sp>
-      <p:cxnSp>
-        <p:nvCxnSpPr>
-          <p:cNvPr id="38" name="Google Shape;255;p24">
-            <a:extLst>
-              <a:ext uri="{FF2B5EF4-FFF2-40B4-BE49-F238E27FC236}">
-                <a16:creationId xmlns:a16="http://schemas.microsoft.com/office/drawing/2014/main" id="{6F44A0DA-4E02-BA48-B90E-C9F2768C6EF9}"/>
-              </a:ext>
-            </a:extLst>
-          </p:cNvPr>
-          <p:cNvCxnSpPr>
-            <a:cxnSpLocks/>
-            <a:stCxn id="33" idx="2"/>
-            <a:endCxn id="15" idx="0"/>
-          </p:cNvCxnSpPr>
-          <p:nvPr/>
-        </p:nvCxnSpPr>
-        <p:spPr>
-          <a:xfrm rot="5400000">
-            <a:off x="1484567" y="4843025"/>
-            <a:ext cx="603472" cy="3341"/>
-          </a:xfrm>
-          <a:prstGeom prst="bentConnector3">
-            <a:avLst>
-              <a:gd name="adj1" fmla="val 50000"/>
-            </a:avLst>
-          </a:prstGeom>
-          <a:noFill/>
-          <a:ln w="28575" cap="flat" cmpd="sng">
-            <a:solidFill>
-              <a:srgbClr val="999999"/>
-            </a:solidFill>
-            <a:prstDash val="dash"/>
-            <a:round/>
-            <a:headEnd type="none" w="med" len="med"/>
-            <a:tailEnd type="triangle" w="med" len="med"/>
-          </a:ln>
-        </p:spPr>
-      </p:cxnSp>
       <p:pic>
         <p:nvPicPr>
           <p:cNvPr id="44" name="Google Shape;637;p35">
@@ -4801,7 +4778,7 @@
         </p:blipFill>
         <p:spPr>
           <a:xfrm>
-            <a:off x="3367210" y="5145223"/>
+            <a:off x="3367210" y="5120640"/>
             <a:ext cx="599803" cy="599800"/>
           </a:xfrm>
           <a:prstGeom prst="rect">
@@ -4835,7 +4812,7 @@
         </p:blipFill>
         <p:spPr>
           <a:xfrm>
-            <a:off x="4131739" y="5140811"/>
+            <a:off x="4131739" y="5120640"/>
             <a:ext cx="599803" cy="599800"/>
           </a:xfrm>
           <a:prstGeom prst="rect">
@@ -4869,7 +4846,7 @@
         </p:blipFill>
         <p:spPr>
           <a:xfrm>
-            <a:off x="4900001" y="5144565"/>
+            <a:off x="4900001" y="5120640"/>
             <a:ext cx="599803" cy="599800"/>
           </a:xfrm>
           <a:prstGeom prst="rect">
@@ -4881,44 +4858,6 @@
           </a:ln>
         </p:spPr>
       </p:pic>
-      <p:cxnSp>
-        <p:nvCxnSpPr>
-          <p:cNvPr id="47" name="Google Shape;255;p24">
-            <a:extLst>
-              <a:ext uri="{FF2B5EF4-FFF2-40B4-BE49-F238E27FC236}">
-                <a16:creationId xmlns:a16="http://schemas.microsoft.com/office/drawing/2014/main" id="{6667A6E2-2102-6949-BC81-780FA80FE1FE}"/>
-              </a:ext>
-            </a:extLst>
-          </p:cNvPr>
-          <p:cNvCxnSpPr>
-            <a:cxnSpLocks/>
-            <a:stCxn id="16" idx="0"/>
-            <a:endCxn id="30" idx="2"/>
-          </p:cNvCxnSpPr>
-          <p:nvPr/>
-        </p:nvCxnSpPr>
-        <p:spPr>
-          <a:xfrm rot="16200000" flipV="1">
-            <a:off x="2757720" y="2741281"/>
-            <a:ext cx="1912925" cy="11152"/>
-          </a:xfrm>
-          <a:prstGeom prst="bentConnector3">
-            <a:avLst>
-              <a:gd name="adj1" fmla="val 50000"/>
-            </a:avLst>
-          </a:prstGeom>
-          <a:noFill/>
-          <a:ln w="28575" cap="flat" cmpd="sng">
-            <a:solidFill>
-              <a:srgbClr val="999999"/>
-            </a:solidFill>
-            <a:prstDash val="dash"/>
-            <a:round/>
-            <a:headEnd type="none" w="med" len="med"/>
-            <a:tailEnd type="triangle" w="med" len="med"/>
-          </a:ln>
-        </p:spPr>
-      </p:cxnSp>
       <p:pic>
         <p:nvPicPr>
           <p:cNvPr id="50" name="Google Shape;695;p35">
@@ -4971,21 +4910,21 @@
         </p:nvCxnSpPr>
         <p:spPr>
           <a:xfrm>
-            <a:off x="4849554" y="1784406"/>
-            <a:ext cx="1148" cy="1921113"/>
+            <a:off x="4849554" y="1844580"/>
+            <a:ext cx="1148" cy="1860939"/>
           </a:xfrm>
           <a:prstGeom prst="straightConnector1">
             <a:avLst/>
           </a:prstGeom>
           <a:noFill/>
-          <a:ln w="28575" cap="flat" cmpd="sng">
+          <a:ln w="12700" cap="flat" cmpd="sng">
             <a:solidFill>
-              <a:schemeClr val="dk2"/>
+              <a:srgbClr val="545B64"/>
             </a:solidFill>
             <a:prstDash val="solid"/>
             <a:round/>
-            <a:headEnd type="triangle" w="med" len="med"/>
-            <a:tailEnd type="triangle" w="med" len="med"/>
+            <a:headEnd type="arrow" w="med" len="sm"/>
+            <a:tailEnd type="arrow" w="med" len="sm"/>
           </a:ln>
         </p:spPr>
       </p:cxnSp>
@@ -5031,7 +4970,7 @@
             </a:pPr>
             <a:r>
               <a:rPr lang="en-US" sz="900" dirty="0">
-                <a:latin typeface="Consolas"/>
+                <a:latin typeface="Consolas" panose="020B0609020204030204" pitchFamily="49" charset="0"/>
                 <a:ea typeface="Consolas"/>
                 <a:cs typeface="Consolas"/>
                 <a:sym typeface="Consolas"/>
@@ -5039,7 +4978,7 @@
               <a:t>boot-vault sa</a:t>
             </a:r>
             <a:endParaRPr sz="900" dirty="0">
-              <a:latin typeface="Consolas"/>
+              <a:latin typeface="Consolas" panose="020B0609020204030204" pitchFamily="49" charset="0"/>
               <a:ea typeface="Consolas"/>
               <a:cs typeface="Consolas"/>
               <a:sym typeface="Consolas"/>
@@ -5069,7 +5008,7 @@
         </p:blipFill>
         <p:spPr>
           <a:xfrm>
-            <a:off x="5702737" y="5142786"/>
+            <a:off x="5702737" y="5120640"/>
             <a:ext cx="597831" cy="597825"/>
           </a:xfrm>
           <a:prstGeom prst="rect">
@@ -5093,26 +5032,27 @@
           <p:cNvCxnSpPr>
             <a:cxnSpLocks/>
             <a:stCxn id="36" idx="2"/>
+            <a:endCxn id="56" idx="0"/>
           </p:cNvCxnSpPr>
           <p:nvPr/>
         </p:nvCxnSpPr>
         <p:spPr>
           <a:xfrm>
-            <a:off x="5990501" y="1786758"/>
-            <a:ext cx="21979" cy="3284485"/>
+            <a:off x="5990501" y="1844580"/>
+            <a:ext cx="11152" cy="3276060"/>
           </a:xfrm>
           <a:prstGeom prst="straightConnector1">
             <a:avLst/>
           </a:prstGeom>
           <a:noFill/>
-          <a:ln w="28575" cap="flat" cmpd="sng">
+          <a:ln w="12700" cap="flat" cmpd="sng">
             <a:solidFill>
-              <a:schemeClr val="dk2"/>
+              <a:srgbClr val="545B64"/>
             </a:solidFill>
             <a:prstDash val="solid"/>
             <a:round/>
-            <a:headEnd type="triangle" w="med" len="med"/>
-            <a:tailEnd type="triangle" w="med" len="med"/>
+            <a:headEnd type="arrow" w="med" len="sm"/>
+            <a:tailEnd type="arrow" w="med" len="sm"/>
           </a:ln>
         </p:spPr>
       </p:cxnSp>
@@ -5127,26 +5067,28 @@
           </p:cNvPr>
           <p:cNvCxnSpPr>
             <a:cxnSpLocks/>
+            <a:stCxn id="35" idx="3"/>
+            <a:endCxn id="27" idx="1"/>
           </p:cNvCxnSpPr>
           <p:nvPr/>
         </p:nvCxnSpPr>
         <p:spPr>
-          <a:xfrm>
-            <a:off x="6252531" y="1283647"/>
-            <a:ext cx="498465" cy="0"/>
+          <a:xfrm flipV="1">
+            <a:off x="6113145" y="1272540"/>
+            <a:ext cx="836295" cy="953"/>
           </a:xfrm>
           <a:prstGeom prst="straightConnector1">
             <a:avLst/>
           </a:prstGeom>
           <a:noFill/>
-          <a:ln w="28575" cap="flat" cmpd="sng">
+          <a:ln w="12700" cap="flat" cmpd="sng">
             <a:solidFill>
-              <a:schemeClr val="dk2"/>
+              <a:srgbClr val="545B64"/>
             </a:solidFill>
             <a:prstDash val="solid"/>
-            <a:round/>
-            <a:headEnd type="triangle" w="med" len="med"/>
-            <a:tailEnd type="triangle" w="med" len="med"/>
+            <a:miter lim="800000"/>
+            <a:headEnd type="arrow" w="med" len="sm"/>
+            <a:tailEnd type="arrow" w="med" len="sm"/>
           </a:ln>
         </p:spPr>
       </p:cxnSp>
@@ -5168,7 +5110,7 @@
           <a:blip r:embed="rId20">
             <a:extLst>
               <a:ext uri="{96DAC541-7B7A-43D3-8B79-37D633B846F1}">
-                <asvg:svgBlip xmlns:asvg="http://schemas.microsoft.com/office/drawing/2016/SVG/main" r:embed="rId21"/>
+                <asvg:svgBlip xmlns="" xmlns:asvg="http://schemas.microsoft.com/office/drawing/2016/SVG/main" r:embed="rId21"/>
               </a:ext>
             </a:extLst>
           </a:blip>
@@ -5178,7 +5120,7 @@
         </p:blipFill>
         <p:spPr>
           <a:xfrm>
-            <a:off x="9842544" y="966894"/>
+            <a:off x="9692640" y="1005840"/>
             <a:ext cx="533400" cy="533400"/>
           </a:xfrm>
           <a:prstGeom prst="rect">
@@ -5200,7 +5142,7 @@
         </p:nvSpPr>
         <p:spPr>
           <a:xfrm>
-            <a:off x="7812207" y="1499943"/>
+            <a:off x="7772400" y="1554480"/>
             <a:ext cx="1419128" cy="290100"/>
           </a:xfrm>
           <a:prstGeom prst="rect">
@@ -5227,16 +5169,34 @@
               <a:buNone/>
             </a:pPr>
             <a:r>
-              <a:rPr lang="en-US" sz="900" dirty="0">
-                <a:latin typeface="Consolas"/>
+              <a:rPr lang="en-US" sz="900" smtClean="0">
+                <a:latin typeface="Consolas" panose="020B0609020204030204" pitchFamily="49" charset="0"/>
                 <a:ea typeface="Consolas"/>
                 <a:cs typeface="Consolas"/>
                 <a:sym typeface="Consolas"/>
               </a:rPr>
-              <a:t>Load Balancer</a:t>
+              <a:t>Classic load </a:t>
+            </a:r>
+            <a:r>
+              <a:rPr lang="en-US" sz="900" dirty="0">
+                <a:latin typeface="Consolas" panose="020B0609020204030204" pitchFamily="49" charset="0"/>
+                <a:ea typeface="Consolas"/>
+                <a:cs typeface="Consolas"/>
+                <a:sym typeface="Consolas"/>
+              </a:rPr>
+              <a:t>b</a:t>
+            </a:r>
+            <a:r>
+              <a:rPr lang="en-US" sz="900" smtClean="0">
+                <a:latin typeface="Consolas" panose="020B0609020204030204" pitchFamily="49" charset="0"/>
+                <a:ea typeface="Consolas"/>
+                <a:cs typeface="Consolas"/>
+                <a:sym typeface="Consolas"/>
+              </a:rPr>
+              <a:t>alancer</a:t>
             </a:r>
             <a:endParaRPr sz="900" dirty="0">
-              <a:latin typeface="Consolas"/>
+              <a:latin typeface="Consolas" panose="020B0609020204030204" pitchFamily="49" charset="0"/>
               <a:ea typeface="Consolas"/>
               <a:cs typeface="Consolas"/>
               <a:sym typeface="Consolas"/>
@@ -5262,23 +5222,23 @@
         </p:nvCxnSpPr>
         <p:spPr>
           <a:xfrm rot="5400000" flipH="1" flipV="1">
-            <a:off x="6141222" y="2772070"/>
-            <a:ext cx="3362575" cy="1398523"/>
+            <a:off x="6164576" y="2803252"/>
+            <a:ext cx="3276060" cy="1358716"/>
           </a:xfrm>
           <a:prstGeom prst="bentConnector3">
             <a:avLst>
-              <a:gd name="adj1" fmla="val 90501"/>
+              <a:gd name="adj1" fmla="val 88378"/>
             </a:avLst>
           </a:prstGeom>
           <a:noFill/>
-          <a:ln w="28575" cap="flat" cmpd="sng">
+          <a:ln w="12700" cap="flat" cmpd="sng">
             <a:solidFill>
-              <a:schemeClr val="dk2"/>
+              <a:srgbClr val="545B64"/>
             </a:solidFill>
             <a:prstDash val="solid"/>
             <a:round/>
-            <a:headEnd type="none" w="med" len="med"/>
-            <a:tailEnd type="triangle" w="med" len="med"/>
+            <a:headEnd type="arrow" w="med" len="sm"/>
+            <a:tailEnd type="arrow" w="med" len="sm"/>
           </a:ln>
         </p:spPr>
       </p:cxnSp>
@@ -5324,7 +5284,7 @@
             </a:pPr>
             <a:r>
               <a:rPr lang="en-US" sz="900" dirty="0">
-                <a:latin typeface="Consolas"/>
+                <a:latin typeface="Consolas" panose="020B0609020204030204" pitchFamily="49" charset="0"/>
                 <a:ea typeface="Consolas"/>
                 <a:cs typeface="Consolas"/>
                 <a:sym typeface="Consolas"/>
@@ -5376,7 +5336,7 @@
             </a:pPr>
             <a:r>
               <a:rPr lang="en-US" sz="900" dirty="0">
-                <a:latin typeface="Consolas"/>
+                <a:latin typeface="Consolas" panose="020B0609020204030204" pitchFamily="49" charset="0"/>
                 <a:ea typeface="Consolas"/>
                 <a:cs typeface="Consolas"/>
                 <a:sym typeface="Consolas"/>
@@ -5428,7 +5388,7 @@
             </a:pPr>
             <a:r>
               <a:rPr lang="en-US" sz="900" dirty="0">
-                <a:latin typeface="Consolas"/>
+                <a:latin typeface="Consolas" panose="020B0609020204030204" pitchFamily="49" charset="0"/>
                 <a:ea typeface="Consolas"/>
                 <a:cs typeface="Consolas"/>
                 <a:sym typeface="Consolas"/>
@@ -5480,7 +5440,7 @@
             </a:pPr>
             <a:r>
               <a:rPr lang="en-US" sz="900" dirty="0">
-                <a:latin typeface="Consolas"/>
+                <a:latin typeface="Consolas" panose="020B0609020204030204" pitchFamily="49" charset="0"/>
                 <a:ea typeface="Consolas"/>
                 <a:cs typeface="Consolas"/>
                 <a:sym typeface="Consolas"/>
@@ -5508,7 +5468,7 @@
           <a:blip r:embed="rId22">
             <a:extLst>
               <a:ext uri="{96DAC541-7B7A-43D3-8B79-37D633B846F1}">
-                <asvg:svgBlip xmlns:asvg="http://schemas.microsoft.com/office/drawing/2016/SVG/main" r:embed="rId23"/>
+                <asvg:svgBlip xmlns="" xmlns:asvg="http://schemas.microsoft.com/office/drawing/2016/SVG/main" r:embed="rId23"/>
               </a:ext>
             </a:extLst>
           </a:blip>
@@ -5518,7 +5478,7 @@
         </p:blipFill>
         <p:spPr>
           <a:xfrm>
-            <a:off x="8343666" y="1116356"/>
+            <a:off x="8321040" y="1097280"/>
             <a:ext cx="352425" cy="352425"/>
           </a:xfrm>
           <a:prstGeom prst="rect">
@@ -5537,26 +5497,28 @@
           </p:cNvPr>
           <p:cNvCxnSpPr>
             <a:cxnSpLocks/>
+            <a:stCxn id="78" idx="3"/>
+            <a:endCxn id="64" idx="1"/>
           </p:cNvCxnSpPr>
           <p:nvPr/>
         </p:nvCxnSpPr>
         <p:spPr>
-          <a:xfrm>
-            <a:off x="8774349" y="1248464"/>
-            <a:ext cx="952866" cy="0"/>
+          <a:xfrm flipV="1">
+            <a:off x="8673465" y="1272540"/>
+            <a:ext cx="1019175" cy="953"/>
           </a:xfrm>
           <a:prstGeom prst="straightConnector1">
             <a:avLst/>
           </a:prstGeom>
           <a:noFill/>
-          <a:ln w="28575" cap="flat" cmpd="sng">
+          <a:ln w="12700" cap="flat" cmpd="sng">
             <a:solidFill>
-              <a:schemeClr val="dk2"/>
+              <a:srgbClr val="545B64"/>
             </a:solidFill>
             <a:prstDash val="solid"/>
-            <a:round/>
-            <a:headEnd type="triangle" w="med" len="med"/>
-            <a:tailEnd type="triangle" w="med" len="med"/>
+            <a:miter lim="800000"/>
+            <a:headEnd type="arrow" w="med" len="sm"/>
+            <a:tailEnd type="arrow" w="med" len="sm"/>
           </a:ln>
         </p:spPr>
       </p:cxnSp>
@@ -5574,7 +5536,7 @@
         </p:nvSpPr>
         <p:spPr>
           <a:xfrm>
-            <a:off x="9404674" y="1502252"/>
+            <a:off x="9250680" y="1554480"/>
             <a:ext cx="1419128" cy="290100"/>
           </a:xfrm>
           <a:prstGeom prst="rect">
@@ -5601,16 +5563,146 @@
               <a:buNone/>
             </a:pPr>
             <a:r>
-              <a:rPr lang="en-US" sz="900" dirty="0">
-                <a:latin typeface="Consolas"/>
+              <a:rPr lang="en-US" sz="900" smtClean="0">
+                <a:latin typeface="Consolas" panose="020B0609020204030204" pitchFamily="49" charset="0"/>
                 <a:ea typeface="Consolas"/>
                 <a:cs typeface="Consolas"/>
                 <a:sym typeface="Consolas"/>
               </a:rPr>
-              <a:t>ACM certificate</a:t>
+              <a:t>AWS Certificate Manager</a:t>
             </a:r>
             <a:endParaRPr sz="900" dirty="0">
-              <a:latin typeface="Consolas"/>
+              <a:latin typeface="Consolas" panose="020B0609020204030204" pitchFamily="49" charset="0"/>
+              <a:ea typeface="Consolas"/>
+              <a:cs typeface="Consolas"/>
+              <a:sym typeface="Consolas"/>
+            </a:endParaRPr>
+          </a:p>
+        </p:txBody>
+      </p:sp>
+      <p:cxnSp>
+        <p:nvCxnSpPr>
+          <p:cNvPr id="67" name="Google Shape;401;p28">
+            <a:extLst>
+              <a:ext uri="{FF2B5EF4-FFF2-40B4-BE49-F238E27FC236}">
+                <a16:creationId xmlns:a16="http://schemas.microsoft.com/office/drawing/2014/main" id="{10586476-E22A-B145-8A93-923E0BB32A93}"/>
+              </a:ext>
+            </a:extLst>
+          </p:cNvPr>
+          <p:cNvCxnSpPr>
+            <a:cxnSpLocks/>
+            <a:stCxn id="30" idx="2"/>
+            <a:endCxn id="16" idx="0"/>
+          </p:cNvCxnSpPr>
+          <p:nvPr/>
+        </p:nvCxnSpPr>
+        <p:spPr>
+          <a:xfrm>
+            <a:off x="3718132" y="1844580"/>
+            <a:ext cx="1626" cy="1858739"/>
+          </a:xfrm>
+          <a:prstGeom prst="straightConnector1">
+            <a:avLst/>
+          </a:prstGeom>
+          <a:noFill/>
+          <a:ln w="12700" cap="flat" cmpd="sng">
+            <a:solidFill>
+              <a:srgbClr val="545B64"/>
+            </a:solidFill>
+            <a:prstDash val="dash"/>
+            <a:round/>
+            <a:headEnd type="arrow" w="med" len="sm"/>
+            <a:tailEnd type="none" w="med" len="sm"/>
+          </a:ln>
+        </p:spPr>
+      </p:cxnSp>
+      <p:cxnSp>
+        <p:nvCxnSpPr>
+          <p:cNvPr id="71" name="Google Shape;401;p28">
+            <a:extLst>
+              <a:ext uri="{FF2B5EF4-FFF2-40B4-BE49-F238E27FC236}">
+                <a16:creationId xmlns:a16="http://schemas.microsoft.com/office/drawing/2014/main" id="{10586476-E22A-B145-8A93-923E0BB32A93}"/>
+              </a:ext>
+            </a:extLst>
+          </p:cNvPr>
+          <p:cNvCxnSpPr>
+            <a:cxnSpLocks/>
+            <a:stCxn id="15" idx="0"/>
+            <a:endCxn id="33" idx="2"/>
+          </p:cNvCxnSpPr>
+          <p:nvPr/>
+        </p:nvCxnSpPr>
+        <p:spPr>
+          <a:xfrm flipV="1">
+            <a:off x="1784632" y="4542959"/>
+            <a:ext cx="3341" cy="577681"/>
+          </a:xfrm>
+          <a:prstGeom prst="straightConnector1">
+            <a:avLst/>
+          </a:prstGeom>
+          <a:noFill/>
+          <a:ln w="12700" cap="flat" cmpd="sng">
+            <a:solidFill>
+              <a:srgbClr val="545B64"/>
+            </a:solidFill>
+            <a:prstDash val="dash"/>
+            <a:round/>
+            <a:headEnd type="arrow" w="med" len="sm"/>
+            <a:tailEnd type="none" w="med" len="sm"/>
+          </a:ln>
+        </p:spPr>
+      </p:cxnSp>
+      <p:sp>
+        <p:nvSpPr>
+          <p:cNvPr id="80" name="Google Shape;413;p28">
+            <a:extLst>
+              <a:ext uri="{FF2B5EF4-FFF2-40B4-BE49-F238E27FC236}">
+                <a16:creationId xmlns:a16="http://schemas.microsoft.com/office/drawing/2014/main" id="{12458160-1689-184C-8A60-B4FF9C4784E9}"/>
+              </a:ext>
+            </a:extLst>
+          </p:cNvPr>
+          <p:cNvSpPr txBox="1"/>
+          <p:nvPr/>
+        </p:nvSpPr>
+        <p:spPr>
+          <a:xfrm>
+            <a:off x="9540240" y="2746006"/>
+            <a:ext cx="859233" cy="290100"/>
+          </a:xfrm>
+          <a:prstGeom prst="rect">
+            <a:avLst/>
+          </a:prstGeom>
+          <a:noFill/>
+          <a:ln>
+            <a:noFill/>
+          </a:ln>
+        </p:spPr>
+        <p:txBody>
+          <a:bodyPr spcFirstLastPara="1" wrap="square" lIns="91425" tIns="91425" rIns="91425" bIns="91425" anchor="ctr" anchorCtr="0">
+            <a:noAutofit/>
+          </a:bodyPr>
+          <a:lstStyle/>
+          <a:p>
+            <a:pPr marL="0" lvl="0" indent="0" algn="ctr" rtl="0">
+              <a:spcBef>
+                <a:spcPts val="0"/>
+              </a:spcBef>
+              <a:spcAft>
+                <a:spcPts val="0"/>
+              </a:spcAft>
+              <a:buNone/>
+            </a:pPr>
+            <a:r>
+              <a:rPr lang="en-US" sz="900" smtClean="0">
+                <a:latin typeface="Consolas" panose="020B0609020204030204" pitchFamily="49" charset="0"/>
+                <a:ea typeface="Consolas"/>
+                <a:cs typeface="Consolas"/>
+                <a:sym typeface="Consolas"/>
+              </a:rPr>
+              <a:t>Amazon EKS</a:t>
+            </a:r>
+            <a:endParaRPr sz="900" dirty="0">
+              <a:latin typeface="Consolas" panose="020B0609020204030204" pitchFamily="49" charset="0"/>
               <a:ea typeface="Consolas"/>
               <a:cs typeface="Consolas"/>
               <a:sym typeface="Consolas"/>

</xml_diff>